<commit_message>
Removed non-utf8 characters, removed skipped lines for bs4, adapted header for bs4
</commit_message>
<xml_diff>
--- a/designed.pptx
+++ b/designed.pptx
@@ -3804,7 +3804,7 @@
                 <a:latin typeface="Open Sans" panose="020B0606030504020204" pitchFamily="34" charset="0"/>
                 <a:ea typeface="Open Sans" panose="020B0606030504020204" pitchFamily="34" charset="0"/>
               </a:rPr>
-              <a:t>…</a:t>
+              <a:t/>
             </a:r>
             <a:endParaRPr lang="en-US" sz="2000" dirty="0" smtClean="0">
               <a:solidFill>
@@ -4067,11 +4067,7 @@
         </p:nvPicPr>
         <p:blipFill>
           <a:blip r:embed="rId3">
-            <a:extLst>
-              <a:ext uri="{28A0092B-C50C-407E-A947-70E740481C1C}">
-                <a14:useLocalDpi xmlns:a14="http://schemas.microsoft.com/office/drawing/2010/main" val="0"/>
-              </a:ext>
-            </a:extLst>
+            <a:extLst/>
           </a:blip>
           <a:stretch>
             <a:fillRect/>
@@ -4097,11 +4093,7 @@
         </p:nvPicPr>
         <p:blipFill>
           <a:blip r:embed="rId4">
-            <a:extLst>
-              <a:ext uri="{28A0092B-C50C-407E-A947-70E740481C1C}">
-                <a14:useLocalDpi xmlns:a14="http://schemas.microsoft.com/office/drawing/2010/main" val="0"/>
-              </a:ext>
-            </a:extLst>
+            <a:extLst/>
           </a:blip>
           <a:stretch>
             <a:fillRect/>
@@ -4220,11 +4212,7 @@
         </p:nvPicPr>
         <p:blipFill>
           <a:blip r:embed="rId5">
-            <a:extLst>
-              <a:ext uri="{28A0092B-C50C-407E-A947-70E740481C1C}">
-                <a14:useLocalDpi xmlns:a14="http://schemas.microsoft.com/office/drawing/2010/main" val="0"/>
-              </a:ext>
-            </a:extLst>
+            <a:extLst/>
           </a:blip>
           <a:stretch>
             <a:fillRect/>

</xml_diff>

<commit_message>
This version didn't load in my Power Point 365
</commit_message>
<xml_diff>
--- a/designed.pptx
+++ b/designed.pptx
@@ -3804,7 +3804,7 @@
                 <a:latin typeface="Open Sans" panose="020B0606030504020204" pitchFamily="34" charset="0"/>
                 <a:ea typeface="Open Sans" panose="020B0606030504020204" pitchFamily="34" charset="0"/>
               </a:rPr>
-              <a:t/>
+              <a:t>…</a:t>
             </a:r>
             <a:endParaRPr lang="en-US" sz="2000" dirty="0" smtClean="0">
               <a:solidFill>
@@ -4067,7 +4067,11 @@
         </p:nvPicPr>
         <p:blipFill>
           <a:blip r:embed="rId3">
-            <a:extLst/>
+            <a:extLst>
+              <a:ext uri="{28A0092B-C50C-407E-A947-70E740481C1C}">
+                <a14:useLocalDpi xmlns:a14="http://schemas.microsoft.com/office/drawing/2010/main" val="0"/>
+              </a:ext>
+            </a:extLst>
           </a:blip>
           <a:stretch>
             <a:fillRect/>
@@ -4093,7 +4097,11 @@
         </p:nvPicPr>
         <p:blipFill>
           <a:blip r:embed="rId4">
-            <a:extLst/>
+            <a:extLst>
+              <a:ext uri="{28A0092B-C50C-407E-A947-70E740481C1C}">
+                <a14:useLocalDpi xmlns:a14="http://schemas.microsoft.com/office/drawing/2010/main" val="0"/>
+              </a:ext>
+            </a:extLst>
           </a:blip>
           <a:stretch>
             <a:fillRect/>
@@ -4212,7 +4220,11 @@
         </p:nvPicPr>
         <p:blipFill>
           <a:blip r:embed="rId5">
-            <a:extLst/>
+            <a:extLst>
+              <a:ext uri="{28A0092B-C50C-407E-A947-70E740481C1C}">
+                <a14:useLocalDpi xmlns:a14="http://schemas.microsoft.com/office/drawing/2010/main" val="0"/>
+              </a:ext>
+            </a:extLst>
           </a:blip>
           <a:stretch>
             <a:fillRect/>

</xml_diff>